<commit_message>
Update Se arregla el orden de las carpetas y sus archivos
</commit_message>
<xml_diff>
--- a/01 - FaseAnálisis/01 - Trimestre/01 - Componente Metodológico/ComponenteMetodologico.pptx
+++ b/01 - FaseAnálisis/01 - Trimestre/01 - Componente Metodológico/ComponenteMetodologico.pptx
@@ -8083,7 +8083,7 @@
         <p:spPr>
           <a:xfrm>
             <a:off x="540795" y="1336647"/>
-            <a:ext cx="8221436" cy="3046948"/>
+            <a:ext cx="8221436" cy="2800726"/>
           </a:xfrm>
           <a:prstGeom prst="rect">
             <a:avLst/>
@@ -8206,7 +8206,25 @@
                 </a:solidFill>
                 <a:latin typeface="Candara" panose="020E0502030303020204" pitchFamily="34" charset="0"/>
               </a:rPr>
-              <a:t>Desarrollar la interfaz gráfica acorde a la necesidad y el querer de la empresa. (HTML, CSS, JS, etc.)</a:t>
+              <a:t>Desarrollar la interfaz gráfica acorde a la </a:t>
+            </a:r>
+            <a:r>
+              <a:rPr lang="es-ES" sz="1600" smtClean="0">
+                <a:solidFill>
+                  <a:srgbClr val="2E3338"/>
+                </a:solidFill>
+                <a:latin typeface="Candara" panose="020E0502030303020204" pitchFamily="34" charset="0"/>
+              </a:rPr>
+              <a:t>necesidad de </a:t>
+            </a:r>
+            <a:r>
+              <a:rPr lang="es-ES" sz="1600" dirty="0" smtClean="0">
+                <a:solidFill>
+                  <a:srgbClr val="2E3338"/>
+                </a:solidFill>
+                <a:latin typeface="Candara" panose="020E0502030303020204" pitchFamily="34" charset="0"/>
+              </a:rPr>
+              <a:t>la empresa. (HTML, CSS, JS, etc.)</a:t>
             </a:r>
           </a:p>
           <a:p>
@@ -8221,7 +8239,25 @@
                 </a:solidFill>
                 <a:latin typeface="Candara" panose="020E0502030303020204" pitchFamily="34" charset="0"/>
               </a:rPr>
-              <a:t>Conectar la interfaz gráfica con la base de datos para que la información pueda ser manipulada por el usuario. (Java)</a:t>
+              <a:t>Conectar la interfaz gráfica con la base de datos para que la información pueda ser manipulada por el usuario. (</a:t>
+            </a:r>
+            <a:r>
+              <a:rPr lang="es-ES" sz="1600" dirty="0" err="1" smtClean="0">
+                <a:solidFill>
+                  <a:srgbClr val="2E3338"/>
+                </a:solidFill>
+                <a:latin typeface="Candara" panose="020E0502030303020204" pitchFamily="34" charset="0"/>
+              </a:rPr>
+              <a:t>Python</a:t>
+            </a:r>
+            <a:r>
+              <a:rPr lang="es-ES" sz="1600" dirty="0" smtClean="0">
+                <a:solidFill>
+                  <a:srgbClr val="2E3338"/>
+                </a:solidFill>
+                <a:latin typeface="Candara" panose="020E0502030303020204" pitchFamily="34" charset="0"/>
+              </a:rPr>
+              <a:t>)</a:t>
             </a:r>
           </a:p>
           <a:p>
@@ -8986,7 +9022,25 @@
                 </a:solidFill>
                 <a:latin typeface="Candara" panose="020E0502030303020204" pitchFamily="34" charset="0"/>
               </a:rPr>
-              <a:t>Es una oportunidad de oro implementar las T.I.C en una microempresa debido a que tendrá una proyección favorable con respecto a los desafíos venideros.</a:t>
+              <a:t>Es una oportunidad de oro implementar las T.I.C en una microempresa debido a </a:t>
+            </a:r>
+            <a:r>
+              <a:rPr lang="es-ES" sz="1600" smtClean="0">
+                <a:solidFill>
+                  <a:srgbClr val="2E3338"/>
+                </a:solidFill>
+                <a:latin typeface="Candara" panose="020E0502030303020204" pitchFamily="34" charset="0"/>
+              </a:rPr>
+              <a:t>que ésta </a:t>
+            </a:r>
+            <a:r>
+              <a:rPr lang="es-ES" sz="1600" dirty="0" smtClean="0">
+                <a:solidFill>
+                  <a:srgbClr val="2E3338"/>
+                </a:solidFill>
+                <a:latin typeface="Candara" panose="020E0502030303020204" pitchFamily="34" charset="0"/>
+              </a:rPr>
+              <a:t>tendrá una proyección favorable con respecto a los desafíos venideros.</a:t>
             </a:r>
             <a:endParaRPr lang="es-ES" sz="1600" dirty="0">
               <a:solidFill>

</xml_diff>